<commit_message>
mise a jour des documents
</commit_message>
<xml_diff>
--- a/Nouveau Présentation Microsoft Office PowerPoint.pptx
+++ b/Nouveau Présentation Microsoft Office PowerPoint.pptx
@@ -5144,39 +5144,8 @@
                 <a:ea typeface="+mn-ea"/>
                 <a:cs typeface="+mn-cs"/>
               </a:rPr>
-              <a:t>Gwenaël </a:t>
-            </a:r>
-            <a:r>
-              <a:rPr kumimoji="0" lang="fr-FR" sz="2700" b="0" i="0" u="none" strike="noStrike" kern="1200" cap="none" spc="0" normalizeH="0" baseline="0" noProof="0" dirty="0" smtClean="0">
-                <a:ln>
-                  <a:noFill/>
-                </a:ln>
-                <a:solidFill>
-                  <a:schemeClr val="tx2"/>
-                </a:solidFill>
-                <a:effectLst/>
-                <a:uLnTx/>
-                <a:uFillTx/>
-                <a:latin typeface="+mn-lt"/>
-                <a:ea typeface="+mn-ea"/>
-                <a:cs typeface="+mn-cs"/>
-              </a:rPr>
-              <a:t>GRESSIER</a:t>
-            </a:r>
-            <a:endParaRPr kumimoji="0" lang="fr-FR" sz="2700" b="0" i="0" u="none" strike="noStrike" kern="1200" cap="none" spc="0" normalizeH="0" baseline="0" noProof="0" dirty="0" smtClean="0">
-              <a:ln>
-                <a:noFill/>
-              </a:ln>
-              <a:solidFill>
-                <a:schemeClr val="tx2"/>
-              </a:solidFill>
-              <a:effectLst/>
-              <a:uLnTx/>
-              <a:uFillTx/>
-              <a:latin typeface="+mn-lt"/>
-              <a:ea typeface="+mn-ea"/>
-              <a:cs typeface="+mn-cs"/>
-            </a:endParaRPr>
+              <a:t>Gwenaël GRESSIER</a:t>
+            </a:r>
           </a:p>
           <a:p>
             <a:pPr marL="0" marR="64008" lvl="0" indent="0" algn="r" defTabSz="914400" rtl="0" eaLnBrk="1" fontAlgn="auto" latinLnBrk="0" hangingPunct="1">
@@ -5331,12 +5300,12 @@
           </a:p>
           <a:p>
             <a:r>
-              <a:rPr lang="fr-FR" sz="1600" dirty="0" err="1" smtClean="0"/>
-              <a:t>pourtout</a:t>
-            </a:r>
-            <a:r>
-              <a:rPr lang="fr-FR" sz="1600" dirty="0" smtClean="0"/>
-              <a:t> les items dans mon </a:t>
+              <a:rPr lang="fr-FR" sz="1600" dirty="0" smtClean="0"/>
+              <a:t>Pour tout </a:t>
+            </a:r>
+            <a:r>
+              <a:rPr lang="fr-FR" sz="1600" dirty="0" smtClean="0"/>
+              <a:t>les items dans mon </a:t>
             </a:r>
             <a:r>
               <a:rPr lang="fr-FR" sz="1600" dirty="0" err="1" smtClean="0"/>
@@ -5370,39 +5339,14 @@
               <a:rPr lang="fr-FR" sz="1600" dirty="0" smtClean="0"/>
               <a:t> </a:t>
             </a:r>
+          </a:p>
+          <a:p>
             <a:endParaRPr lang="fr-FR" sz="1600" dirty="0" smtClean="0"/>
           </a:p>
           <a:p>
-            <a:endParaRPr lang="fr-FR" sz="1600" dirty="0" smtClean="0"/>
-          </a:p>
-          <a:p>
-            <a:r>
-              <a:rPr lang="fr-FR" sz="1600" dirty="0" smtClean="0"/>
-              <a:t>Pour </a:t>
-            </a:r>
-            <a:r>
-              <a:rPr lang="fr-FR" sz="1600" dirty="0" smtClean="0"/>
-              <a:t>afficher un tableau </a:t>
-            </a:r>
-            <a:r>
-              <a:rPr lang="fr-FR" sz="1600" dirty="0" smtClean="0"/>
-              <a:t>récapitulatif </a:t>
-            </a:r>
-            <a:r>
-              <a:rPr lang="fr-FR" sz="1600" dirty="0" smtClean="0"/>
-              <a:t>des achat dans la page panier </a:t>
-            </a:r>
-            <a:r>
-              <a:rPr lang="fr-FR" sz="1600" dirty="0" smtClean="0"/>
-              <a:t>je </a:t>
-            </a:r>
-            <a:r>
-              <a:rPr lang="fr-FR" sz="1600" dirty="0" smtClean="0"/>
-              <a:t>vais utiliser la </a:t>
-            </a:r>
-            <a:r>
-              <a:rPr lang="fr-FR" sz="1600" dirty="0" smtClean="0"/>
-              <a:t>méthode </a:t>
+            <a:r>
+              <a:rPr lang="fr-FR" sz="1600" dirty="0" smtClean="0"/>
+              <a:t>Pour afficher un tableau récapitulatif des achat dans la page panier je vais utiliser la méthode </a:t>
             </a:r>
             <a:r>
               <a:rPr lang="fr-FR" sz="1600" dirty="0" err="1" smtClean="0"/>
@@ -5607,7 +5551,6 @@
               <a:rPr lang="fr-FR" dirty="0" smtClean="0"/>
               <a:t>}`; ligne 188</a:t>
             </a:r>
-            <a:endParaRPr lang="fr-FR" dirty="0" smtClean="0"/>
           </a:p>
           <a:p>
             <a:endParaRPr lang="fr-FR" dirty="0" smtClean="0"/>
@@ -6024,7 +5967,6 @@
               <a:rPr lang="fr-FR" sz="1600" dirty="0" smtClean="0"/>
               <a:t> des produit commander </a:t>
             </a:r>
-            <a:endParaRPr lang="fr-FR" sz="1600" dirty="0" smtClean="0"/>
           </a:p>
           <a:p>
             <a:pPr>
@@ -6035,11 +5977,7 @@
           <a:p>
             <a:r>
               <a:rPr lang="fr-FR" sz="1600" dirty="0" smtClean="0"/>
-              <a:t>Puis </a:t>
-            </a:r>
-            <a:r>
-              <a:rPr lang="fr-FR" sz="1600" dirty="0" smtClean="0"/>
-              <a:t>je fait un POST a mon api </a:t>
+              <a:t>Puis je fait un POST a mon api </a:t>
             </a:r>
             <a:r>
               <a:rPr lang="fr-FR" sz="1600" dirty="0" err="1" smtClean="0"/>
@@ -6065,7 +6003,6 @@
               <a:rPr lang="fr-FR" sz="1600" dirty="0" smtClean="0"/>
               <a:t> 220 </a:t>
             </a:r>
-            <a:endParaRPr lang="fr-FR" sz="1600" dirty="0" smtClean="0"/>
           </a:p>
           <a:p>
             <a:endParaRPr lang="fr-FR" dirty="0"/>
@@ -6494,23 +6431,7 @@
           <a:p>
             <a:r>
               <a:rPr lang="fr-FR" sz="1600" dirty="0" smtClean="0"/>
-              <a:t>Pour se faire j’ai enlever les </a:t>
-            </a:r>
-            <a:r>
-              <a:rPr lang="fr-FR" sz="1600" dirty="0" smtClean="0"/>
-              <a:t>partie de code </a:t>
-            </a:r>
-            <a:r>
-              <a:rPr lang="fr-FR" sz="1600" dirty="0" smtClean="0"/>
-              <a:t>commenter du </a:t>
-            </a:r>
-            <a:r>
-              <a:rPr lang="fr-FR" sz="1600" dirty="0" smtClean="0"/>
-              <a:t>site sur chacune des page ou ses dernière étais présente </a:t>
-            </a:r>
-            <a:r>
-              <a:rPr lang="fr-FR" sz="1600" dirty="0" smtClean="0"/>
-              <a:t>pour voire à quoi devais ressembler le site une fois finit.</a:t>
+              <a:t>Pour se faire j’ai enlever les partie de code commenter du site sur chacune des page ou ses dernière étais présente pour voire à quoi devais ressembler le site une fois finit.</a:t>
             </a:r>
             <a:endParaRPr lang="fr-FR" sz="1600" dirty="0"/>
           </a:p>
@@ -6585,11 +6506,15 @@
           <a:p>
             <a:r>
               <a:rPr lang="fr-FR" sz="1600" dirty="0" smtClean="0"/>
-              <a:t>Ensuite en ayant prise connaissance </a:t>
-            </a:r>
-            <a:r>
-              <a:rPr lang="fr-FR" sz="1600" dirty="0" smtClean="0"/>
-              <a:t>des spécification fonctionnelle j’ai décider la méthode </a:t>
+              <a:t>Ensuite en ayant prise connaissance des spécification fonctionnelle j’ai </a:t>
+            </a:r>
+            <a:r>
+              <a:rPr lang="fr-FR" sz="1600" dirty="0" smtClean="0"/>
+              <a:t>décider  d’utiliser </a:t>
+            </a:r>
+            <a:r>
+              <a:rPr lang="fr-FR" sz="1600" dirty="0" smtClean="0"/>
+              <a:t>la méthode </a:t>
             </a:r>
             <a:r>
               <a:rPr lang="fr-FR" sz="1600" dirty="0" err="1" smtClean="0"/>
@@ -6599,7 +6524,6 @@
               <a:rPr lang="fr-FR" sz="1600" dirty="0" smtClean="0"/>
               <a:t> sur l’adresse suivante pour récupérais toute les information relative a mes canapé </a:t>
             </a:r>
-            <a:endParaRPr lang="fr-FR" sz="1600" dirty="0" smtClean="0"/>
           </a:p>
           <a:p>
             <a:r>
@@ -6623,13 +6547,8 @@
           <a:p>
             <a:r>
               <a:rPr lang="fr-FR" sz="1600" dirty="0" smtClean="0"/>
-              <a:t>Nous pouvon</a:t>
-            </a:r>
-            <a:r>
-              <a:rPr lang="fr-FR" sz="1600" dirty="0" smtClean="0"/>
-              <a:t>s voire un exemple à la ligne 1 à 10 de mon script.js</a:t>
-            </a:r>
-            <a:endParaRPr lang="fr-FR" sz="1600" dirty="0" smtClean="0"/>
+              <a:t>Nous pouvons voire un exemple à la ligne 1 à 10 de mon script.js</a:t>
+            </a:r>
           </a:p>
         </p:txBody>
       </p:sp>
@@ -6726,7 +6645,6 @@
               <a:rPr lang="fr-FR" sz="1600" dirty="0" smtClean="0"/>
               <a:t> </a:t>
             </a:r>
-            <a:endParaRPr lang="fr-FR" sz="1600" dirty="0" smtClean="0"/>
           </a:p>
           <a:p>
             <a:r>
@@ -6745,15 +6663,7 @@
           <a:p>
             <a:r>
               <a:rPr lang="fr-FR" sz="1600" dirty="0" smtClean="0"/>
-              <a:t>Ma </a:t>
-            </a:r>
-            <a:r>
-              <a:rPr lang="fr-FR" sz="1600" dirty="0" smtClean="0"/>
-              <a:t>b</a:t>
-            </a:r>
-            <a:r>
-              <a:rPr lang="fr-FR" sz="1600" dirty="0" smtClean="0"/>
-              <a:t>oucle </a:t>
+              <a:t>Ma boucle </a:t>
             </a:r>
             <a:r>
               <a:rPr lang="fr-FR" sz="1600" dirty="0" err="1" smtClean="0"/>
@@ -6803,7 +6713,6 @@
               <a:rPr lang="fr-FR" sz="1600" dirty="0" smtClean="0"/>
               <a:t> chaque l’objet en question </a:t>
             </a:r>
-            <a:endParaRPr lang="fr-FR" sz="1600" dirty="0" smtClean="0"/>
           </a:p>
           <a:p>
             <a:endParaRPr lang="fr-FR" sz="1600" dirty="0" smtClean="0"/>
@@ -6813,7 +6722,6 @@
               <a:rPr lang="fr-FR" sz="1700" dirty="0" smtClean="0"/>
               <a:t>Cette dernier fonction me permet la manipulation de mon dom</a:t>
             </a:r>
-            <a:endParaRPr lang="fr-FR" sz="1700" dirty="0" smtClean="0"/>
           </a:p>
         </p:txBody>
       </p:sp>
@@ -6886,11 +6794,7 @@
           <a:p>
             <a:r>
               <a:rPr lang="fr-FR" sz="1600" dirty="0" smtClean="0"/>
-              <a:t>Pour faire le lien j’ai crée </a:t>
-            </a:r>
-            <a:r>
-              <a:rPr lang="fr-FR" sz="1600" dirty="0" smtClean="0"/>
-              <a:t>une </a:t>
+              <a:t>Pour faire le lien j’ai crée une </a:t>
             </a:r>
             <a:r>
               <a:rPr lang="fr-FR" sz="1600" dirty="0" err="1" smtClean="0"/>
@@ -6898,15 +6802,7 @@
             </a:r>
             <a:r>
               <a:rPr lang="fr-FR" sz="1600" dirty="0" smtClean="0"/>
-              <a:t> ligne 37, que j’attache a mon article grâce </a:t>
-            </a:r>
-            <a:r>
-              <a:rPr lang="fr-FR" sz="1600" dirty="0" smtClean="0"/>
-              <a:t>à un </a:t>
-            </a:r>
-            <a:r>
-              <a:rPr lang="fr-FR" sz="1600" dirty="0" smtClean="0"/>
-              <a:t> </a:t>
+              <a:t> ligne 37, que j’attache a mon article grâce à un  </a:t>
             </a:r>
             <a:r>
               <a:rPr lang="fr-FR" sz="1600" dirty="0" err="1" smtClean="0"/>
@@ -6914,15 +6810,7 @@
             </a:r>
             <a:r>
               <a:rPr lang="fr-FR" sz="1600" dirty="0" smtClean="0"/>
-              <a:t> </a:t>
-            </a:r>
-            <a:r>
-              <a:rPr lang="fr-FR" sz="1600" dirty="0" smtClean="0"/>
-              <a:t>ligne </a:t>
-            </a:r>
-            <a:r>
-              <a:rPr lang="fr-FR" sz="1600" dirty="0" smtClean="0"/>
-              <a:t>39</a:t>
+              <a:t> ligne 39</a:t>
             </a:r>
           </a:p>
           <a:p>
@@ -6931,13 +6819,8 @@
           <a:p>
             <a:r>
               <a:rPr lang="fr-FR" sz="1600" dirty="0" smtClean="0"/>
-              <a:t>Au quelle je lui est passer </a:t>
-            </a:r>
-            <a:r>
-              <a:rPr lang="fr-FR" sz="1600" dirty="0" smtClean="0"/>
-              <a:t>ligne 38 l’adresse de ma page produit avec l’id de mon item</a:t>
-            </a:r>
-            <a:endParaRPr lang="fr-FR" sz="1600" dirty="0" smtClean="0"/>
+              <a:t>Au quelle je lui est passer ligne 38 l’adresse de ma page produit avec l’id de mon item</a:t>
+            </a:r>
           </a:p>
           <a:p>
             <a:r>
@@ -6946,11 +6829,7 @@
             </a:r>
             <a:r>
               <a:rPr lang="fr-FR" sz="1600" dirty="0" smtClean="0"/>
-              <a:t> </a:t>
-            </a:r>
-            <a:r>
-              <a:rPr lang="fr-FR" sz="1600" dirty="0" smtClean="0"/>
-              <a:t>= "./product.html?id=" + </a:t>
+              <a:t> = "./product.html?id=" + </a:t>
             </a:r>
             <a:r>
               <a:rPr lang="fr-FR" sz="1600" i="1" dirty="0" err="1" smtClean="0"/>
@@ -7070,13 +6949,8 @@
           <a:p>
             <a:r>
               <a:rPr lang="fr-FR" sz="1600" dirty="0" smtClean="0"/>
-              <a:t>Pour récupérais se qu’il y a âpres le ? dans </a:t>
-            </a:r>
-            <a:r>
-              <a:rPr lang="fr-FR" sz="1600" dirty="0" smtClean="0"/>
-              <a:t>l'url ligne 2 j’utilise une</a:t>
-            </a:r>
-            <a:endParaRPr lang="fr-FR" sz="1600" dirty="0" smtClean="0"/>
+              <a:t>Pour récupérais se qu’il y a âpres le ? dans l'url ligne 2 j’utilise une</a:t>
+            </a:r>
           </a:p>
           <a:p>
             <a:r>
@@ -7110,11 +6984,7 @@
           <a:p>
             <a:r>
               <a:rPr lang="fr-FR" sz="1600" dirty="0" smtClean="0"/>
-              <a:t>Ensuite ligne 3 je récupère </a:t>
-            </a:r>
-            <a:r>
-              <a:rPr lang="fr-FR" sz="1600" dirty="0" smtClean="0"/>
-              <a:t>les </a:t>
+              <a:t>Ensuite ligne 3 je récupère les </a:t>
             </a:r>
             <a:r>
               <a:rPr lang="fr-FR" sz="1600" dirty="0" err="1" smtClean="0"/>
@@ -7122,13 +6992,8 @@
             </a:r>
             <a:r>
               <a:rPr lang="fr-FR" sz="1600" dirty="0" smtClean="0"/>
-              <a:t> </a:t>
-            </a:r>
-            <a:r>
-              <a:rPr lang="fr-FR" sz="1600" dirty="0" smtClean="0"/>
-              <a:t>de l'url </a:t>
-            </a:r>
-            <a:endParaRPr lang="fr-FR" sz="1600" dirty="0" smtClean="0"/>
+              <a:t> de l'url </a:t>
+            </a:r>
           </a:p>
           <a:p>
             <a:r>
@@ -7178,17 +7043,8 @@
             </a:r>
             <a:r>
               <a:rPr lang="fr-FR" sz="1600" dirty="0" smtClean="0"/>
-              <a:t> pour </a:t>
-            </a:r>
-            <a:r>
-              <a:rPr lang="fr-FR" sz="1600" dirty="0" smtClean="0"/>
-              <a:t>récupérer </a:t>
-            </a:r>
-            <a:r>
-              <a:rPr lang="fr-FR" sz="1600" dirty="0" smtClean="0"/>
-              <a:t>l'id ligne 4</a:t>
-            </a:r>
-            <a:endParaRPr lang="fr-FR" sz="1600" dirty="0" smtClean="0"/>
+              <a:t> pour récupérer l'id ligne 4</a:t>
+            </a:r>
           </a:p>
           <a:p>
             <a:r>
@@ -7208,42 +7064,6 @@
             <a:br>
               <a:rPr lang="fr-FR" sz="1600" dirty="0" smtClean="0"/>
             </a:br>
-            <a:r>
-              <a:rPr lang="fr-FR" sz="1600" dirty="0" smtClean="0"/>
-              <a:t>et je fait un </a:t>
-            </a:r>
-            <a:r>
-              <a:rPr lang="fr-FR" sz="1600" dirty="0" err="1" smtClean="0"/>
-              <a:t>fetch</a:t>
-            </a:r>
-            <a:r>
-              <a:rPr lang="fr-FR" sz="1600" dirty="0" smtClean="0"/>
-              <a:t> avec l'id récupérais de l'url se qui me permet d’accéder uniquement au produit </a:t>
-            </a:r>
-            <a:r>
-              <a:rPr lang="fr-FR" sz="1600" dirty="0" err="1" smtClean="0"/>
-              <a:t>sélectionné.ligne</a:t>
-            </a:r>
-            <a:r>
-              <a:rPr lang="fr-FR" sz="1600" dirty="0" smtClean="0"/>
-              <a:t> 7</a:t>
-            </a:r>
-            <a:endParaRPr lang="fr-FR" sz="1600" dirty="0" smtClean="0"/>
-          </a:p>
-          <a:p>
-            <a:r>
-              <a:rPr lang="fr-FR" sz="1600" dirty="0" err="1" smtClean="0"/>
-              <a:t>fetch</a:t>
-            </a:r>
-            <a:r>
-              <a:rPr lang="fr-FR" sz="1600" dirty="0" smtClean="0"/>
-              <a:t>(`http://localhost:3000/api/products/${id}`)</a:t>
-            </a:r>
-          </a:p>
-          <a:p>
-            <a:pPr>
-              <a:buNone/>
-            </a:pPr>
             <a:endParaRPr lang="fr-FR" dirty="0"/>
           </a:p>
         </p:txBody>
@@ -7317,7 +7137,52 @@
           <a:p>
             <a:r>
               <a:rPr lang="fr-FR" sz="1600" dirty="0" smtClean="0"/>
-              <a:t>J’insère les produits dans ma page grâce a la fonction </a:t>
+              <a:t>J’insère les produits dans ma page grâce a </a:t>
+            </a:r>
+            <a:r>
+              <a:rPr lang="fr-FR" sz="1600" dirty="0" smtClean="0"/>
+              <a:t>un </a:t>
+            </a:r>
+            <a:r>
+              <a:rPr lang="fr-FR" sz="1600" dirty="0" err="1" smtClean="0"/>
+              <a:t>fetch</a:t>
+            </a:r>
+            <a:r>
+              <a:rPr lang="fr-FR" sz="1600" dirty="0" smtClean="0"/>
+              <a:t> avec l'id récupérais de l'url se qui me permet d’accéder uniquement au produit </a:t>
+            </a:r>
+            <a:r>
+              <a:rPr lang="fr-FR" sz="1600" dirty="0" err="1" smtClean="0"/>
+              <a:t>sélectionné.ligne</a:t>
+            </a:r>
+            <a:r>
+              <a:rPr lang="fr-FR" sz="1600" dirty="0" smtClean="0"/>
+              <a:t> </a:t>
+            </a:r>
+            <a:r>
+              <a:rPr lang="fr-FR" sz="1600" dirty="0" smtClean="0"/>
+              <a:t>7</a:t>
+            </a:r>
+          </a:p>
+          <a:p>
+            <a:endParaRPr lang="fr-FR" sz="1600" dirty="0" smtClean="0"/>
+          </a:p>
+          <a:p>
+            <a:r>
+              <a:rPr lang="fr-FR" sz="1600" dirty="0" smtClean="0"/>
+              <a:t>Ce dernier </a:t>
+            </a:r>
+            <a:r>
+              <a:rPr lang="fr-FR" sz="1600" dirty="0" err="1" smtClean="0"/>
+              <a:t>apelle</a:t>
+            </a:r>
+            <a:r>
+              <a:rPr lang="fr-FR" sz="1600" dirty="0" smtClean="0"/>
+              <a:t> ma  </a:t>
+            </a:r>
+            <a:r>
+              <a:rPr lang="fr-FR" sz="1600" dirty="0" smtClean="0"/>
+              <a:t>fonction </a:t>
             </a:r>
             <a:r>
               <a:rPr lang="fr-FR" sz="1600" dirty="0" err="1" smtClean="0"/>
@@ -7495,15 +7360,7 @@
           <a:p>
             <a:r>
               <a:rPr lang="fr-FR" sz="1600" dirty="0" smtClean="0"/>
-              <a:t>Pour </a:t>
-            </a:r>
-            <a:r>
-              <a:rPr lang="fr-FR" sz="1600" dirty="0" smtClean="0"/>
-              <a:t>ajouter </a:t>
-            </a:r>
-            <a:r>
-              <a:rPr lang="fr-FR" sz="1600" dirty="0" smtClean="0"/>
-              <a:t>des produits dans mon panier j’appelle ma </a:t>
+              <a:t>Pour ajouter des produits dans mon panier j’appelle ma </a:t>
             </a:r>
             <a:r>
               <a:rPr lang="fr-FR" sz="1600" dirty="0" err="1" smtClean="0"/>
@@ -7519,13 +7376,8 @@
             </a:r>
             <a:r>
               <a:rPr lang="fr-FR" sz="1600" dirty="0" smtClean="0"/>
-              <a:t> de ma page </a:t>
-            </a:r>
-            <a:r>
-              <a:rPr lang="fr-FR" sz="1600" dirty="0" smtClean="0"/>
-              <a:t>product.js a la ligne 50 a 52</a:t>
-            </a:r>
-            <a:endParaRPr lang="fr-FR" sz="1600" dirty="0" smtClean="0"/>
+              <a:t> de ma page product.js a la ligne 50 a 52</a:t>
+            </a:r>
           </a:p>
           <a:p>
             <a:r>
@@ -7546,19 +7398,7 @@
             </a:r>
             <a:r>
               <a:rPr lang="fr-FR" sz="1600" dirty="0" smtClean="0"/>
-              <a:t> </a:t>
-            </a:r>
-            <a:r>
-              <a:rPr lang="fr-FR" sz="1600" dirty="0" smtClean="0"/>
-              <a:t>à</a:t>
-            </a:r>
-            <a:r>
-              <a:rPr lang="fr-FR" sz="1600" dirty="0" smtClean="0"/>
-              <a:t> la </a:t>
-            </a:r>
-            <a:r>
-              <a:rPr lang="fr-FR" sz="1600" dirty="0" smtClean="0"/>
-              <a:t>quelle je rattache toute les info importante </a:t>
+              <a:t> à la quelle je rattache toute les info importante </a:t>
             </a:r>
           </a:p>
           <a:p>
@@ -7586,15 +7426,39 @@
             </a:r>
             <a:r>
               <a:rPr lang="fr-FR" sz="1600" dirty="0" smtClean="0"/>
-              <a:t> je l’additionne </a:t>
-            </a:r>
-            <a:r>
-              <a:rPr lang="fr-FR" sz="1600" dirty="0" smtClean="0"/>
-              <a:t>à </a:t>
-            </a:r>
-            <a:r>
-              <a:rPr lang="fr-FR" sz="1600" dirty="0" smtClean="0"/>
-              <a:t>la valeur précédente sinon je le push dans le </a:t>
+              <a:t> je l’additionne à la valeur précédente </a:t>
+            </a:r>
+            <a:r>
+              <a:rPr lang="fr-FR" sz="1600" dirty="0" smtClean="0"/>
+              <a:t>et </a:t>
+            </a:r>
+            <a:r>
+              <a:rPr lang="fr-FR" sz="1600" dirty="0" smtClean="0"/>
+              <a:t>je fait appelle a ma </a:t>
+            </a:r>
+            <a:r>
+              <a:rPr lang="fr-FR" sz="1600" dirty="0" err="1" smtClean="0"/>
+              <a:t>function</a:t>
+            </a:r>
+            <a:r>
+              <a:rPr lang="fr-FR" sz="1600" dirty="0" smtClean="0"/>
+              <a:t> </a:t>
+            </a:r>
+            <a:r>
+              <a:rPr lang="fr-FR" sz="1600" dirty="0" err="1" smtClean="0"/>
+              <a:t>saveCart</a:t>
+            </a:r>
+            <a:r>
+              <a:rPr lang="fr-FR" sz="1600" dirty="0" smtClean="0"/>
+              <a:t> si il ni est pas je push le produit </a:t>
+            </a:r>
+            <a:r>
+              <a:rPr lang="fr-FR" sz="1600" dirty="0" smtClean="0"/>
+              <a:t>dans </a:t>
+            </a:r>
+            <a:r>
+              <a:rPr lang="fr-FR" sz="1600" dirty="0" smtClean="0"/>
+              <a:t>mon </a:t>
             </a:r>
             <a:r>
               <a:rPr lang="fr-FR" sz="1600" dirty="0" err="1" smtClean="0"/>
@@ -7602,15 +7466,7 @@
             </a:r>
             <a:r>
               <a:rPr lang="fr-FR" sz="1600" dirty="0" smtClean="0"/>
-              <a:t> et je fait appelle a ma </a:t>
-            </a:r>
-            <a:r>
-              <a:rPr lang="fr-FR" sz="1600" dirty="0" err="1" smtClean="0"/>
-              <a:t>function</a:t>
-            </a:r>
-            <a:r>
-              <a:rPr lang="fr-FR" sz="1600" dirty="0" smtClean="0"/>
-              <a:t> </a:t>
+              <a:t> et je fait appelle a cette a </a:t>
             </a:r>
             <a:r>
               <a:rPr lang="fr-FR" sz="1600" dirty="0" err="1" smtClean="0"/>
@@ -7618,43 +7474,7 @@
             </a:r>
             <a:r>
               <a:rPr lang="fr-FR" sz="1600" dirty="0" smtClean="0"/>
-              <a:t> si il ni est pas je push le produit ans mon </a:t>
-            </a:r>
-            <a:r>
-              <a:rPr lang="fr-FR" sz="1600" dirty="0" err="1" smtClean="0"/>
-              <a:t>cart</a:t>
-            </a:r>
-            <a:r>
-              <a:rPr lang="fr-FR" sz="1600" dirty="0" smtClean="0"/>
-              <a:t> et je </a:t>
-            </a:r>
-            <a:r>
-              <a:rPr lang="fr-FR" sz="1600" dirty="0" smtClean="0"/>
-              <a:t>f</a:t>
-            </a:r>
-            <a:r>
-              <a:rPr lang="fr-FR" sz="1600" dirty="0" smtClean="0"/>
-              <a:t>ait appelle a </a:t>
-            </a:r>
-            <a:r>
-              <a:rPr lang="fr-FR" sz="1600" dirty="0" smtClean="0"/>
-              <a:t>cette </a:t>
-            </a:r>
-            <a:r>
-              <a:rPr lang="fr-FR" sz="1600" dirty="0" smtClean="0"/>
-              <a:t>a </a:t>
-            </a:r>
-            <a:r>
-              <a:rPr lang="fr-FR" sz="1600" dirty="0" err="1" smtClean="0"/>
-              <a:t>saveCart</a:t>
-            </a:r>
-            <a:r>
-              <a:rPr lang="fr-FR" sz="1600" dirty="0" smtClean="0"/>
               <a:t> </a:t>
-            </a:r>
-            <a:r>
-              <a:rPr lang="fr-FR" sz="1600" dirty="0" smtClean="0"/>
-              <a:t/>
             </a:r>
             <a:br>
               <a:rPr lang="fr-FR" sz="1600" dirty="0" smtClean="0"/>
@@ -7690,7 +7510,6 @@
               <a:rPr lang="fr-FR" sz="1800" dirty="0" smtClean="0"/>
               <a:t> ligne 110</a:t>
             </a:r>
-            <a:endParaRPr lang="fr-FR" sz="1800" dirty="0" smtClean="0"/>
           </a:p>
           <a:p>
             <a:r>
@@ -7698,12 +7517,12 @@
               <a:t>Demande si nous avons finit les achats si oui nous somme </a:t>
             </a:r>
             <a:r>
-              <a:rPr lang="fr-FR" sz="1800" dirty="0" err="1" smtClean="0"/>
-              <a:t>rdiriger</a:t>
-            </a:r>
-            <a:r>
               <a:rPr lang="fr-FR" sz="1800" dirty="0" smtClean="0"/>
-              <a:t> vers le panier </a:t>
+              <a:t>rediriger </a:t>
+            </a:r>
+            <a:r>
+              <a:rPr lang="fr-FR" sz="1800" dirty="0" smtClean="0"/>
+              <a:t>vers le panier </a:t>
             </a:r>
             <a:r>
               <a:rPr lang="fr-FR" sz="1800" dirty="0" err="1" smtClean="0"/>
@@ -7723,11 +7542,7 @@
             </a:r>
             <a:r>
               <a:rPr lang="fr-FR" sz="1800" dirty="0" err="1" smtClean="0"/>
-              <a:t>redirect</a:t>
-            </a:r>
-            <a:r>
-              <a:rPr lang="fr-FR" sz="1800" dirty="0" err="1" smtClean="0"/>
-              <a:t>ToCart</a:t>
+              <a:t>redirectToCart</a:t>
             </a:r>
             <a:r>
               <a:rPr lang="fr-FR" sz="1800" dirty="0" smtClean="0"/>

</xml_diff>